<commit_message>
bug fix when no slides selected
</commit_message>
<xml_diff>
--- a/WSLatexPPT/temp/sample.pptx
+++ b/WSLatexPPT/temp/sample.pptx
@@ -104,6 +104,11 @@
       </a:defRPr>
     </a:lvl9pPr>
   </p:defaultTextStyle>
+  <p:extLst>
+    <p:ext uri="{EFAFB233-063F-42B5-8137-9DF3F51BA10A}">
+      <p15:sldGuideLst xmlns:p15="http://schemas.microsoft.com/office/powerpoint/2012/main"/>
+    </p:ext>
+  </p:extLst>
 </p:presentation>
 </file>
 
@@ -3667,6 +3672,45 @@
           </a:p>
         </p:txBody>
       </p:sp>
+      <p:pic>
+        <p:nvPicPr>
+          <p:cNvPr id="5" name="グラフィックス 4">
+            <a:extLst>
+              <a:ext uri="{FF2B5EF4-FFF2-40B4-BE49-F238E27FC236}">
+                <a16:creationId xmlns:a16="http://schemas.microsoft.com/office/drawing/2014/main" id="{0A26F30A-56BC-E1E8-9133-70D71BF790EE}"/>
+              </a:ext>
+            </a:extLst>
+          </p:cNvPr>
+          <p:cNvPicPr>
+            <a:picLocks noChangeAspect="1"/>
+          </p:cNvPicPr>
+          <p:nvPr/>
+        </p:nvPicPr>
+        <p:blipFill>
+          <a:blip r:embed="rId2">
+            <a:extLst>
+              <a:ext uri="{28A0092B-C50C-407E-A947-70E740481C1C}">
+                <a14:useLocalDpi xmlns:a14="http://schemas.microsoft.com/office/drawing/2010/main" val="0"/>
+              </a:ext>
+              <a:ext uri="{96DAC541-7B7A-43D3-8B79-37D633B846F1}">
+                <asvg:svgBlip xmlns:asvg="http://schemas.microsoft.com/office/drawing/2016/SVG/main" r:embed="rId3"/>
+              </a:ext>
+            </a:extLst>
+          </a:blip>
+          <a:stretch>
+            <a:fillRect/>
+          </a:stretch>
+        </p:blipFill>
+        <p:spPr>
+          <a:xfrm>
+            <a:off x="1349529" y="944563"/>
+            <a:ext cx="762000" cy="85725"/>
+          </a:xfrm>
+          <a:prstGeom prst="rect">
+            <a:avLst/>
+          </a:prstGeom>
+        </p:spPr>
+      </p:pic>
     </p:spTree>
     <p:extLst>
       <p:ext uri="{BB962C8B-B14F-4D97-AF65-F5344CB8AC3E}">

</xml_diff>